<commit_message>
Addition to intro part.
</commit_message>
<xml_diff>
--- a/GA_Group7_DotMap Final Preposition.pptx
+++ b/GA_Group7_DotMap Final Preposition.pptx
@@ -11705,7 +11705,7 @@
               <a:t> </a:t>
             </a:r>
             <a:r>
-              <a:rPr lang="en-US" dirty="0" err="1" smtClean="0"/>
+              <a:rPr lang="en-US" dirty="0" err="1"/>
               <a:t>Petrova</a:t>
             </a:r>
             <a:endParaRPr lang="en-US" dirty="0"/>
@@ -11721,7 +11721,7 @@
               <a:t> </a:t>
             </a:r>
             <a:r>
-              <a:rPr lang="en-US" dirty="0" err="1" smtClean="0"/>
+              <a:rPr lang="en-US" dirty="0" err="1"/>
               <a:t>Stoica</a:t>
             </a:r>
             <a:endParaRPr lang="en-US" dirty="0"/>
@@ -11769,10 +11769,9 @@
           <a:lstStyle/>
           <a:p>
             <a:r>
-              <a:rPr lang="en-US" altLang="nl-NL" dirty="0" smtClean="0"/>
+              <a:rPr lang="en-US" altLang="nl-NL" dirty="0"/>
               <a:t>Splitting dots into groups</a:t>
             </a:r>
-            <a:endParaRPr lang="en-US" altLang="nl-NL" dirty="0"/>
           </a:p>
         </p:txBody>
       </p:sp>
@@ -11823,7 +11822,7 @@
           <a:p>
             <a:pPr lvl="2"/>
             <a:r>
-              <a:rPr lang="en-US" altLang="zh-CN" sz="1400" dirty="0" smtClean="0"/>
+              <a:rPr lang="en-US" altLang="zh-CN" sz="1400" dirty="0"/>
               <a:t>Number of dots of each cell need to reach the minimum percentage (20%) of the maximum number</a:t>
             </a:r>
             <a:endParaRPr lang="en-US" altLang="nl-NL" sz="1400" dirty="0"/>
@@ -11876,10 +11875,9 @@
           <a:lstStyle/>
           <a:p>
             <a:r>
-              <a:rPr lang="en-US" altLang="nl-NL" dirty="0" smtClean="0"/>
+              <a:rPr lang="en-US" altLang="nl-NL" dirty="0"/>
               <a:t>Size/radius of dots</a:t>
             </a:r>
-            <a:endParaRPr lang="en-US" altLang="nl-NL" dirty="0"/>
           </a:p>
         </p:txBody>
       </p:sp>
@@ -11959,11 +11957,7 @@
             </a:pPr>
             <a:r>
               <a:rPr lang="en-US" altLang="nl-NL" sz="1800" dirty="0"/>
-              <a:t>For better visibility, we give a minimum radius of the dot, for instance 4</a:t>
-            </a:r>
-            <a:r>
-              <a:rPr lang="en-US" altLang="nl-NL" sz="1800" dirty="0" smtClean="0"/>
-              <a:t>.</a:t>
+              <a:t>For better visibility, we give a minimum radius of the dot, for instance 4.</a:t>
             </a:r>
             <a:endParaRPr lang="en-US" altLang="nl-NL" sz="2800" dirty="0"/>
           </a:p>
@@ -12015,10 +12009,9 @@
           <a:lstStyle/>
           <a:p>
             <a:r>
-              <a:rPr lang="en-US" altLang="nl-NL" dirty="0" smtClean="0"/>
+              <a:rPr lang="en-US" altLang="nl-NL" dirty="0"/>
               <a:t>Location of dots</a:t>
             </a:r>
-            <a:endParaRPr lang="en-US" altLang="nl-NL" dirty="0"/>
           </a:p>
         </p:txBody>
       </p:sp>
@@ -12047,7 +12040,7 @@
               <a:buChar char="•"/>
             </a:pPr>
             <a:r>
-              <a:rPr lang="en-US" altLang="nl-NL" sz="2400" dirty="0" smtClean="0"/>
+              <a:rPr lang="en-US" altLang="nl-NL" sz="2400" dirty="0"/>
               <a:t>Location</a:t>
             </a:r>
           </a:p>
@@ -12057,7 +12050,7 @@
               <a:buChar char="•"/>
             </a:pPr>
             <a:r>
-              <a:rPr lang="en-US" altLang="nl-NL" sz="2400" dirty="0" smtClean="0"/>
+              <a:rPr lang="en-US" altLang="nl-NL" sz="2400" dirty="0"/>
               <a:t>Overlapping solution</a:t>
             </a:r>
           </a:p>
@@ -12116,10 +12109,9 @@
           <a:lstStyle/>
           <a:p>
             <a:r>
-              <a:rPr lang="en-US" altLang="nl-NL" dirty="0" smtClean="0"/>
+              <a:rPr lang="en-US" altLang="nl-NL" dirty="0"/>
               <a:t>Location of dots</a:t>
             </a:r>
-            <a:endParaRPr lang="en-US" altLang="nl-NL" dirty="0"/>
           </a:p>
         </p:txBody>
       </p:sp>
@@ -12146,13 +12138,8 @@
             <a:pPr lvl="1"/>
             <a:r>
               <a:rPr lang="en-US" altLang="nl-NL" sz="2400" dirty="0"/>
-              <a:t>Where to place the </a:t>
-            </a:r>
-            <a:r>
-              <a:rPr lang="en-US" altLang="nl-NL" sz="2400" dirty="0" smtClean="0"/>
-              <a:t>dot.</a:t>
-            </a:r>
-            <a:endParaRPr lang="en-US" altLang="nl-NL" sz="2400" dirty="0"/>
+              <a:t>Where to place the dot.</a:t>
+            </a:r>
           </a:p>
           <a:p>
             <a:pPr lvl="2"/>
@@ -12231,10 +12218,9 @@
           <a:lstStyle/>
           <a:p>
             <a:r>
-              <a:rPr lang="en-US" altLang="nl-NL" dirty="0" smtClean="0"/>
+              <a:rPr lang="en-US" altLang="nl-NL" dirty="0"/>
               <a:t>Location of dots</a:t>
             </a:r>
-            <a:endParaRPr lang="en-US" altLang="nl-NL" dirty="0"/>
           </a:p>
         </p:txBody>
       </p:sp>
@@ -12263,12 +12249,8 @@
               <a:buChar char="•"/>
             </a:pPr>
             <a:r>
-              <a:rPr lang="en-US" altLang="zh-CN" sz="2800" dirty="0" smtClean="0"/>
-              <a:t>Solve </a:t>
-            </a:r>
-            <a:r>
               <a:rPr lang="en-US" altLang="zh-CN" sz="2800" dirty="0"/>
-              <a:t>the overlapping</a:t>
+              <a:t>Solve the overlapping</a:t>
             </a:r>
             <a:endParaRPr lang="en-US" altLang="nl-NL" sz="2800" dirty="0"/>
           </a:p>
@@ -12344,10 +12326,9 @@
           <a:lstStyle/>
           <a:p>
             <a:r>
-              <a:rPr lang="en-US" altLang="nl-NL" dirty="0" smtClean="0"/>
+              <a:rPr lang="en-US" altLang="nl-NL" dirty="0"/>
               <a:t>Coloring dots</a:t>
             </a:r>
-            <a:endParaRPr lang="en-US" altLang="nl-NL" dirty="0"/>
           </a:p>
         </p:txBody>
       </p:sp>
@@ -12376,7 +12357,7 @@
               <a:buChar char="•"/>
             </a:pPr>
             <a:r>
-              <a:rPr lang="en-US" altLang="nl-NL" sz="2400" dirty="0" smtClean="0"/>
+              <a:rPr lang="en-US" altLang="nl-NL" sz="2400" dirty="0"/>
               <a:t>Choosing color palette</a:t>
             </a:r>
           </a:p>
@@ -12386,7 +12367,7 @@
               <a:buChar char="•"/>
             </a:pPr>
             <a:r>
-              <a:rPr lang="en-US" altLang="nl-NL" sz="2400" dirty="0" smtClean="0"/>
+              <a:rPr lang="en-US" altLang="nl-NL" sz="2400" dirty="0"/>
               <a:t>Several solutions depending on ratios</a:t>
             </a:r>
           </a:p>
@@ -12409,14 +12390,6 @@
   <p:clrMapOvr>
     <a:masterClrMapping/>
   </p:clrMapOvr>
-  <mc:AlternateContent xmlns:mc="http://schemas.openxmlformats.org/markup-compatibility/2006" xmlns:p14="http://schemas.microsoft.com/office/powerpoint/2010/main">
-    <mc:Choice Requires="p14">
-      <p:transition spd="slow" p14:dur="2000"/>
-    </mc:Choice>
-    <mc:Fallback xmlns="">
-      <p:transition spd="slow"/>
-    </mc:Fallback>
-  </mc:AlternateContent>
 </p:sld>
 </file>
 
@@ -12453,15 +12426,14 @@
           <a:lstStyle/>
           <a:p>
             <a:r>
-              <a:rPr lang="en-US" altLang="nl-NL" dirty="0" smtClean="0"/>
+              <a:rPr lang="en-US" altLang="nl-NL" dirty="0"/>
               <a:t>Choosing color palette </a:t>
             </a:r>
-            <a:endParaRPr lang="en-US" altLang="nl-NL" dirty="0"/>
-          </a:p>
-        </p:txBody>
-      </p:sp>
-      <mc:AlternateContent xmlns:mc="http://schemas.openxmlformats.org/markup-compatibility/2006">
-        <mc:Choice xmlns:a14="http://schemas.microsoft.com/office/drawing/2010/main" Requires="a14">
+          </a:p>
+        </p:txBody>
+      </p:sp>
+      <mc:AlternateContent xmlns:mc="http://schemas.openxmlformats.org/markup-compatibility/2006" xmlns:a14="http://schemas.microsoft.com/office/drawing/2010/main">
+        <mc:Choice Requires="a14">
           <p:sp>
             <p:nvSpPr>
               <p:cNvPr id="66563" name="Content Placeholder 2"/>
@@ -12726,7 +12698,7 @@
             </p:txBody>
           </p:sp>
         </mc:Choice>
-        <mc:Fallback>
+        <mc:Fallback xmlns="">
           <p:sp>
             <p:nvSpPr>
               <p:cNvPr id="66563" name="Content Placeholder 2"/>
@@ -12769,7 +12741,7 @@
           <p:cNvPr id="4" name="Picture 3">
             <a:extLst>
               <a:ext uri="{FF2B5EF4-FFF2-40B4-BE49-F238E27FC236}">
-                <a16:creationId xmlns:a16="http://schemas.microsoft.com/office/drawing/2014/main" xmlns="" id="{FD054822-F023-4BCD-A593-E1581C64B41C}"/>
+                <a16:creationId xmlns:a16="http://schemas.microsoft.com/office/drawing/2014/main" id="{FD054822-F023-4BCD-A593-E1581C64B41C}"/>
               </a:ext>
             </a:extLst>
           </p:cNvPr>
@@ -12810,14 +12782,6 @@
   <p:clrMapOvr>
     <a:masterClrMapping/>
   </p:clrMapOvr>
-  <mc:AlternateContent xmlns:mc="http://schemas.openxmlformats.org/markup-compatibility/2006" xmlns:p14="http://schemas.microsoft.com/office/powerpoint/2010/main">
-    <mc:Choice Requires="p14">
-      <p:transition spd="slow" p14:dur="2000"/>
-    </mc:Choice>
-    <mc:Fallback xmlns="">
-      <p:transition spd="slow"/>
-    </mc:Fallback>
-  </mc:AlternateContent>
 </p:sld>
 </file>
 
@@ -12854,10 +12818,9 @@
           <a:lstStyle/>
           <a:p>
             <a:r>
-              <a:rPr lang="en-US" altLang="nl-NL" dirty="0" smtClean="0"/>
+              <a:rPr lang="en-US" altLang="nl-NL" dirty="0"/>
               <a:t>Choosing color palette</a:t>
             </a:r>
-            <a:endParaRPr lang="en-US" altLang="nl-NL" dirty="0"/>
           </a:p>
         </p:txBody>
       </p:sp>
@@ -12866,7 +12829,7 @@
           <p:cNvPr id="6" name="Picture 5">
             <a:extLst>
               <a:ext uri="{FF2B5EF4-FFF2-40B4-BE49-F238E27FC236}">
-                <a16:creationId xmlns:a16="http://schemas.microsoft.com/office/drawing/2014/main" xmlns="" id="{EBCFBED3-52AC-4324-8B97-07BDE215B152}"/>
+                <a16:creationId xmlns:a16="http://schemas.microsoft.com/office/drawing/2014/main" id="{EBCFBED3-52AC-4324-8B97-07BDE215B152}"/>
               </a:ext>
             </a:extLst>
           </p:cNvPr>
@@ -12904,7 +12867,7 @@
               <p:cNvPr id="9" name="Content Placeholder 2">
                 <a:extLst>
                   <a:ext uri="{FF2B5EF4-FFF2-40B4-BE49-F238E27FC236}">
-                    <a16:creationId xmlns:a16="http://schemas.microsoft.com/office/drawing/2014/main" xmlns="" id="{5280423E-75A5-4B51-B75D-7AC85226A212}"/>
+                    <a16:creationId xmlns:a16="http://schemas.microsoft.com/office/drawing/2014/main" id="{5280423E-75A5-4B51-B75D-7AC85226A212}"/>
                   </a:ext>
                 </a:extLst>
               </p:cNvPr>
@@ -13025,14 +12988,6 @@
   <p:clrMapOvr>
     <a:masterClrMapping/>
   </p:clrMapOvr>
-  <mc:AlternateContent xmlns:mc="http://schemas.openxmlformats.org/markup-compatibility/2006" xmlns:p14="http://schemas.microsoft.com/office/powerpoint/2010/main">
-    <mc:Choice Requires="p14">
-      <p:transition spd="slow" p14:dur="2000"/>
-    </mc:Choice>
-    <mc:Fallback xmlns="">
-      <p:transition spd="slow"/>
-    </mc:Fallback>
-  </mc:AlternateContent>
 </p:sld>
 </file>
 
@@ -13098,15 +13053,7 @@
             <a:pPr lvl="1"/>
             <a:r>
               <a:rPr lang="en-US" altLang="nl-NL" sz="2800" dirty="0"/>
-              <a:t>S</a:t>
-            </a:r>
-            <a:r>
-              <a:rPr lang="en-US" altLang="nl-NL" sz="2800" dirty="0" smtClean="0"/>
-              <a:t>olution </a:t>
-            </a:r>
-            <a:r>
-              <a:rPr lang="en-US" altLang="nl-NL" sz="2800" dirty="0"/>
-              <a:t>1</a:t>
+              <a:t>Solution 1</a:t>
             </a:r>
           </a:p>
           <a:p>
@@ -13188,14 +13135,6 @@
   <p:clrMapOvr>
     <a:masterClrMapping/>
   </p:clrMapOvr>
-  <mc:AlternateContent xmlns:mc="http://schemas.openxmlformats.org/markup-compatibility/2006" xmlns:p14="http://schemas.microsoft.com/office/powerpoint/2010/main">
-    <mc:Choice Requires="p14">
-      <p:transition spd="slow" p14:dur="2000"/>
-    </mc:Choice>
-    <mc:Fallback xmlns="">
-      <p:transition spd="slow"/>
-    </mc:Fallback>
-  </mc:AlternateContent>
 </p:sld>
 </file>
 
@@ -13260,10 +13199,9 @@
           <a:p>
             <a:pPr lvl="1"/>
             <a:r>
-              <a:rPr lang="en-US" altLang="nl-NL" sz="2800" dirty="0" smtClean="0"/>
+              <a:rPr lang="en-US" altLang="nl-NL" sz="2800" dirty="0"/>
               <a:t>Solution 2</a:t>
             </a:r>
-            <a:endParaRPr lang="en-US" altLang="nl-NL" sz="2800" dirty="0"/>
           </a:p>
           <a:p>
             <a:pPr lvl="2"/>
@@ -13340,14 +13278,6 @@
   <p:clrMapOvr>
     <a:masterClrMapping/>
   </p:clrMapOvr>
-  <mc:AlternateContent xmlns:mc="http://schemas.openxmlformats.org/markup-compatibility/2006" xmlns:p14="http://schemas.microsoft.com/office/powerpoint/2010/main">
-    <mc:Choice Requires="p14">
-      <p:transition spd="slow" p14:dur="2000"/>
-    </mc:Choice>
-    <mc:Fallback xmlns="">
-      <p:transition spd="slow"/>
-    </mc:Fallback>
-  </mc:AlternateContent>
 </p:sld>
 </file>
 
@@ -13385,13 +13315,8 @@
           <a:p>
             <a:r>
               <a:rPr lang="en-US" altLang="nl-NL" dirty="0"/>
-              <a:t>C</a:t>
-            </a:r>
-            <a:r>
-              <a:rPr lang="en-US" altLang="nl-NL" dirty="0" smtClean="0"/>
-              <a:t>ontent</a:t>
-            </a:r>
-            <a:endParaRPr lang="en-US" altLang="nl-NL" dirty="0"/>
+              <a:t>Content</a:t>
+            </a:r>
           </a:p>
         </p:txBody>
       </p:sp>
@@ -13416,14 +13341,14 @@
           <a:lstStyle/>
           <a:p>
             <a:r>
-              <a:rPr lang="en-US" altLang="nl-NL" sz="2000" dirty="0" smtClean="0"/>
+              <a:rPr lang="en-US" altLang="nl-NL" sz="2000" dirty="0"/>
               <a:t>Introduction</a:t>
             </a:r>
           </a:p>
           <a:p>
             <a:pPr lvl="1"/>
             <a:r>
-              <a:rPr lang="en-US" altLang="nl-NL" sz="1800" smtClean="0"/>
+              <a:rPr lang="en-US" altLang="nl-NL" sz="1800"/>
               <a:t>Data generation</a:t>
             </a:r>
             <a:endParaRPr lang="en-US" altLang="nl-NL" sz="1600" dirty="0"/>
@@ -13431,29 +13356,20 @@
           <a:p>
             <a:r>
               <a:rPr lang="en-US" altLang="nl-NL" sz="2000" dirty="0"/>
-              <a:t>Problem </a:t>
-            </a:r>
-            <a:r>
-              <a:rPr lang="en-US" altLang="nl-NL" sz="2000" dirty="0" smtClean="0"/>
-              <a:t>definition</a:t>
-            </a:r>
-          </a:p>
-          <a:p>
-            <a:r>
-              <a:rPr lang="en-US" altLang="nl-NL" sz="2000" dirty="0" smtClean="0"/>
-              <a:t>Proposal </a:t>
-            </a:r>
+              <a:t>Problem definition</a:t>
+            </a:r>
+          </a:p>
+          <a:p>
             <a:r>
               <a:rPr lang="en-US" altLang="nl-NL" sz="2000" dirty="0"/>
-              <a:t>solutions</a:t>
-            </a:r>
-          </a:p>
-          <a:p>
-            <a:r>
-              <a:rPr lang="en-US" altLang="nl-NL" sz="2000" dirty="0" smtClean="0"/>
+              <a:t>Proposal solutions</a:t>
+            </a:r>
+          </a:p>
+          <a:p>
+            <a:r>
+              <a:rPr lang="en-US" altLang="nl-NL" sz="2000" dirty="0"/>
               <a:t>Constraints</a:t>
             </a:r>
-            <a:endParaRPr lang="en-US" altLang="nl-NL" sz="2000" dirty="0"/>
           </a:p>
         </p:txBody>
       </p:sp>
@@ -13503,10 +13419,9 @@
           <a:lstStyle/>
           <a:p>
             <a:r>
-              <a:rPr lang="en-US" altLang="nl-NL" dirty="0" smtClean="0"/>
+              <a:rPr lang="en-US" altLang="nl-NL" dirty="0"/>
               <a:t>Coloring dots</a:t>
             </a:r>
-            <a:endParaRPr lang="en-US" altLang="nl-NL" dirty="0"/>
           </a:p>
         </p:txBody>
       </p:sp>
@@ -13532,12 +13447,8 @@
           <a:p>
             <a:pPr lvl="1"/>
             <a:r>
-              <a:rPr lang="en-US" altLang="nl-NL" sz="2800" dirty="0" smtClean="0"/>
-              <a:t>Solution </a:t>
-            </a:r>
-            <a:r>
               <a:rPr lang="en-US" altLang="nl-NL" sz="2800" dirty="0"/>
-              <a:t>3 (implemented)</a:t>
+              <a:t>Solution 3 (implemented)</a:t>
             </a:r>
           </a:p>
           <a:p>
@@ -13615,14 +13526,6 @@
   <p:clrMapOvr>
     <a:masterClrMapping/>
   </p:clrMapOvr>
-  <mc:AlternateContent xmlns:mc="http://schemas.openxmlformats.org/markup-compatibility/2006" xmlns:p14="http://schemas.microsoft.com/office/powerpoint/2010/main">
-    <mc:Choice Requires="p14">
-      <p:transition spd="slow" p14:dur="2000"/>
-    </mc:Choice>
-    <mc:Fallback xmlns="">
-      <p:transition spd="slow"/>
-    </mc:Fallback>
-  </mc:AlternateContent>
 </p:sld>
 </file>
 
@@ -13688,15 +13591,7 @@
             <a:pPr lvl="1"/>
             <a:r>
               <a:rPr lang="en-US" altLang="nl-NL" sz="2800" dirty="0"/>
-              <a:t>S</a:t>
-            </a:r>
-            <a:r>
-              <a:rPr lang="en-US" altLang="nl-NL" sz="2800" dirty="0" smtClean="0"/>
-              <a:t>olution </a:t>
-            </a:r>
-            <a:r>
-              <a:rPr lang="en-US" altLang="nl-NL" sz="2800" dirty="0"/>
-              <a:t>4</a:t>
+              <a:t>Solution 4</a:t>
             </a:r>
           </a:p>
           <a:p>
@@ -13778,14 +13673,6 @@
   <p:clrMapOvr>
     <a:masterClrMapping/>
   </p:clrMapOvr>
-  <mc:AlternateContent xmlns:mc="http://schemas.openxmlformats.org/markup-compatibility/2006" xmlns:p14="http://schemas.microsoft.com/office/powerpoint/2010/main">
-    <mc:Choice Requires="p14">
-      <p:transition spd="slow" p14:dur="2000"/>
-    </mc:Choice>
-    <mc:Fallback xmlns="">
-      <p:transition spd="slow"/>
-    </mc:Fallback>
-  </mc:AlternateContent>
 </p:sld>
 </file>
 
@@ -14407,88 +14294,346 @@
           <a:lstStyle/>
           <a:p>
             <a:r>
-              <a:rPr lang="en-US" altLang="nl-NL" dirty="0" smtClean="0"/>
+              <a:rPr lang="en-US" altLang="nl-NL" dirty="0"/>
               <a:t>Introduction</a:t>
             </a:r>
-            <a:endParaRPr lang="en-US" altLang="nl-NL" dirty="0"/>
-          </a:p>
-        </p:txBody>
-      </p:sp>
-      <p:sp>
-        <p:nvSpPr>
-          <p:cNvPr id="66563" name="Content Placeholder 2"/>
-          <p:cNvSpPr>
-            <a:spLocks noGrp="1"/>
-          </p:cNvSpPr>
-          <p:nvPr>
-            <p:ph idx="1"/>
-          </p:nvPr>
-        </p:nvSpPr>
-        <p:spPr>
-          <a:xfrm>
-            <a:off x="611188" y="1600200"/>
-            <a:ext cx="7994650" cy="4673116"/>
-          </a:xfrm>
-        </p:spPr>
-        <p:txBody>
-          <a:bodyPr/>
-          <a:lstStyle/>
-          <a:p>
-            <a:r>
-              <a:rPr lang="en-US" altLang="nl-NL" sz="2000" dirty="0" smtClean="0"/>
-              <a:t>Map of Eindhoven</a:t>
-            </a:r>
-          </a:p>
-          <a:p>
-            <a:r>
-              <a:rPr lang="en-US" altLang="nl-NL" sz="2000" dirty="0" smtClean="0"/>
-              <a:t>Roughly 300,000 people</a:t>
-            </a:r>
-          </a:p>
-          <a:p>
-            <a:r>
-              <a:rPr lang="en-US" altLang="nl-NL" sz="2000" dirty="0" smtClean="0"/>
-              <a:t>Split into 5 groups based on origin:</a:t>
-            </a:r>
-            <a:endParaRPr lang="en-US" altLang="nl-NL" sz="2000" dirty="0"/>
-          </a:p>
-          <a:p>
-            <a:pPr lvl="1"/>
-            <a:r>
-              <a:rPr lang="en-US" altLang="nl-NL" sz="1800" dirty="0"/>
-              <a:t>West EU (60%, Green) </a:t>
-            </a:r>
-          </a:p>
-          <a:p>
-            <a:pPr lvl="1"/>
-            <a:r>
-              <a:rPr lang="en-US" altLang="nl-NL" sz="1800" dirty="0"/>
-              <a:t>North EU(15%, Blue) </a:t>
-            </a:r>
-          </a:p>
-          <a:p>
-            <a:pPr lvl="1"/>
-            <a:r>
-              <a:rPr lang="en-US" altLang="nl-NL" sz="1800" dirty="0"/>
-              <a:t>East EU (10%, Red)</a:t>
-            </a:r>
-          </a:p>
-          <a:p>
-            <a:pPr lvl="1"/>
-            <a:r>
-              <a:rPr lang="en-US" altLang="nl-NL" sz="1800" dirty="0"/>
-              <a:t>South EU (10%, Yellow)</a:t>
-            </a:r>
-          </a:p>
-          <a:p>
-            <a:pPr lvl="1"/>
-            <a:r>
-              <a:rPr lang="en-US" altLang="nl-NL" sz="1800" dirty="0"/>
-              <a:t>Non EU (5%, Black)</a:t>
-            </a:r>
-          </a:p>
-        </p:txBody>
-      </p:sp>
+          </a:p>
+        </p:txBody>
+      </p:sp>
+      <mc:AlternateContent xmlns:mc="http://schemas.openxmlformats.org/markup-compatibility/2006">
+        <mc:Choice xmlns:a14="http://schemas.microsoft.com/office/drawing/2010/main" Requires="a14">
+          <p:sp>
+            <p:nvSpPr>
+              <p:cNvPr id="66563" name="Content Placeholder 2"/>
+              <p:cNvSpPr>
+                <a:spLocks noGrp="1"/>
+              </p:cNvSpPr>
+              <p:nvPr>
+                <p:ph idx="1"/>
+              </p:nvPr>
+            </p:nvSpPr>
+            <p:spPr>
+              <a:xfrm>
+                <a:off x="611188" y="1600200"/>
+                <a:ext cx="7994650" cy="4673116"/>
+              </a:xfrm>
+            </p:spPr>
+            <p:txBody>
+              <a:bodyPr/>
+              <a:lstStyle/>
+              <a:p>
+                <a:r>
+                  <a:rPr lang="en-US" altLang="nl-NL" sz="2000" dirty="0"/>
+                  <a:t>Map </a:t>
+                </a:r>
+                <a14:m>
+                  <m:oMath xmlns:m="http://schemas.openxmlformats.org/officeDocument/2006/math">
+                    <m:r>
+                      <a:rPr lang="en-US" altLang="nl-NL" sz="2000" b="1" i="1" smtClean="0">
+                        <a:latin typeface="Cambria Math" panose="02040503050406030204" pitchFamily="18" charset="0"/>
+                      </a:rPr>
+                      <m:t>𝑴</m:t>
+                    </m:r>
+                    <m:r>
+                      <a:rPr lang="en-US" altLang="nl-NL" sz="2000" b="1" i="1" smtClean="0">
+                        <a:latin typeface="Cambria Math" panose="02040503050406030204" pitchFamily="18" charset="0"/>
+                      </a:rPr>
+                      <m:t>={</m:t>
+                    </m:r>
+                    <m:sSub>
+                      <m:sSubPr>
+                        <m:ctrlPr>
+                          <a:rPr lang="en-US" altLang="nl-NL" sz="2000" b="1" i="1" smtClean="0">
+                            <a:latin typeface="Cambria Math" panose="02040503050406030204" pitchFamily="18" charset="0"/>
+                          </a:rPr>
+                        </m:ctrlPr>
+                      </m:sSubPr>
+                      <m:e>
+                        <m:r>
+                          <a:rPr lang="en-US" altLang="nl-NL" sz="2000" b="1" i="1" smtClean="0">
+                            <a:latin typeface="Cambria Math" panose="02040503050406030204" pitchFamily="18" charset="0"/>
+                          </a:rPr>
+                          <m:t>𝒄</m:t>
+                        </m:r>
+                      </m:e>
+                      <m:sub>
+                        <m:r>
+                          <a:rPr lang="en-US" altLang="nl-NL" sz="2000" b="1" i="1" smtClean="0">
+                            <a:latin typeface="Cambria Math" panose="02040503050406030204" pitchFamily="18" charset="0"/>
+                          </a:rPr>
+                          <m:t>𝟏</m:t>
+                        </m:r>
+                      </m:sub>
+                    </m:sSub>
+                    <m:r>
+                      <a:rPr lang="en-US" altLang="nl-NL" sz="2000" b="1" i="1" smtClean="0">
+                        <a:latin typeface="Cambria Math" panose="02040503050406030204" pitchFamily="18" charset="0"/>
+                      </a:rPr>
+                      <m:t>… </m:t>
+                    </m:r>
+                    <m:sSub>
+                      <m:sSubPr>
+                        <m:ctrlPr>
+                          <a:rPr lang="en-US" altLang="nl-NL" sz="2000" b="1" i="1" smtClean="0">
+                            <a:latin typeface="Cambria Math" panose="02040503050406030204" pitchFamily="18" charset="0"/>
+                          </a:rPr>
+                        </m:ctrlPr>
+                      </m:sSubPr>
+                      <m:e>
+                        <m:r>
+                          <a:rPr lang="en-US" altLang="nl-NL" sz="2000" b="1" i="1" smtClean="0">
+                            <a:latin typeface="Cambria Math" panose="02040503050406030204" pitchFamily="18" charset="0"/>
+                          </a:rPr>
+                          <m:t>𝒄</m:t>
+                        </m:r>
+                      </m:e>
+                      <m:sub>
+                        <m:r>
+                          <a:rPr lang="en-US" altLang="nl-NL" sz="2000" b="1" i="1" smtClean="0">
+                            <a:latin typeface="Cambria Math" panose="02040503050406030204" pitchFamily="18" charset="0"/>
+                          </a:rPr>
+                          <m:t>𝒎</m:t>
+                        </m:r>
+                      </m:sub>
+                    </m:sSub>
+                    <m:r>
+                      <a:rPr lang="en-US" altLang="nl-NL" sz="2000" b="1" i="1" smtClean="0">
+                        <a:latin typeface="Cambria Math" panose="02040503050406030204" pitchFamily="18" charset="0"/>
+                      </a:rPr>
+                      <m:t>}</m:t>
+                    </m:r>
+                  </m:oMath>
+                </a14:m>
+                <a:r>
+                  <a:rPr lang="en-US" altLang="nl-NL" sz="2000" dirty="0"/>
+                  <a:t> of Eindhoven</a:t>
+                </a:r>
+              </a:p>
+              <a:p>
+                <a:r>
+                  <a:rPr lang="en-US" altLang="nl-NL" sz="2000" dirty="0"/>
+                  <a:t>Roughly 300,000 people</a:t>
+                </a:r>
+              </a:p>
+              <a:p>
+                <a:r>
+                  <a:rPr lang="en-US" altLang="nl-NL" sz="2000" dirty="0"/>
+                  <a:t>Split into </a:t>
+                </a:r>
+                <a14:m>
+                  <m:oMath xmlns:m="http://schemas.openxmlformats.org/officeDocument/2006/math">
+                    <m:r>
+                      <a:rPr lang="en-US" altLang="nl-NL" sz="2000" b="1" i="1" smtClean="0">
+                        <a:latin typeface="Cambria Math" panose="02040503050406030204" pitchFamily="18" charset="0"/>
+                      </a:rPr>
+                      <m:t>𝒌</m:t>
+                    </m:r>
+                    <m:r>
+                      <a:rPr lang="en-US" altLang="nl-NL" sz="2000" b="1" i="1" smtClean="0">
+                        <a:latin typeface="Cambria Math" panose="02040503050406030204" pitchFamily="18" charset="0"/>
+                      </a:rPr>
+                      <m:t>=</m:t>
+                    </m:r>
+                    <m:r>
+                      <a:rPr lang="en-US" altLang="nl-NL" sz="2000" b="1" i="1" smtClean="0">
+                        <a:latin typeface="Cambria Math" panose="02040503050406030204" pitchFamily="18" charset="0"/>
+                      </a:rPr>
+                      <m:t>𝟓</m:t>
+                    </m:r>
+                  </m:oMath>
+                </a14:m>
+                <a:r>
+                  <a:rPr lang="en-US" altLang="nl-NL" sz="2000" dirty="0"/>
+                  <a:t> groups based on origin:</a:t>
+                </a:r>
+              </a:p>
+              <a:p>
+                <a:pPr lvl="1"/>
+                <a:r>
+                  <a:rPr lang="en-US" altLang="nl-NL" sz="1800" dirty="0"/>
+                  <a:t>West EU (60%, Green) </a:t>
+                </a:r>
+              </a:p>
+              <a:p>
+                <a:pPr lvl="1"/>
+                <a:r>
+                  <a:rPr lang="en-US" altLang="nl-NL" sz="1800" dirty="0"/>
+                  <a:t>North EU(15%, Blue) </a:t>
+                </a:r>
+              </a:p>
+              <a:p>
+                <a:pPr lvl="1"/>
+                <a:r>
+                  <a:rPr lang="en-US" altLang="nl-NL" sz="1800" dirty="0"/>
+                  <a:t>East EU (10%, Red)</a:t>
+                </a:r>
+              </a:p>
+              <a:p>
+                <a:pPr lvl="1"/>
+                <a:r>
+                  <a:rPr lang="en-US" altLang="nl-NL" sz="1800" dirty="0"/>
+                  <a:t>South EU (10%, Yellow)</a:t>
+                </a:r>
+              </a:p>
+              <a:p>
+                <a:pPr lvl="1"/>
+                <a:r>
+                  <a:rPr lang="en-US" altLang="nl-NL" sz="1800" dirty="0"/>
+                  <a:t>Non EU (5%, Black)</a:t>
+                </a:r>
+              </a:p>
+              <a:p>
+                <a:r>
+                  <a:rPr lang="en-US" altLang="nl-NL" sz="2000" dirty="0"/>
+                  <a:t>Zoom level </a:t>
+                </a:r>
+                <a14:m>
+                  <m:oMath xmlns:m="http://schemas.openxmlformats.org/officeDocument/2006/math">
+                    <m:r>
+                      <a:rPr lang="en-US" altLang="nl-NL" sz="2000" b="1" i="1" smtClean="0">
+                        <a:latin typeface="Cambria Math" panose="02040503050406030204" pitchFamily="18" charset="0"/>
+                      </a:rPr>
+                      <m:t>𝒛</m:t>
+                    </m:r>
+                    <m:r>
+                      <a:rPr lang="en-US" altLang="nl-NL" sz="2000" b="1" i="1" smtClean="0">
+                        <a:latin typeface="Cambria Math" panose="02040503050406030204" pitchFamily="18" charset="0"/>
+                      </a:rPr>
+                      <m:t>, </m:t>
+                    </m:r>
+                    <m:sSub>
+                      <m:sSubPr>
+                        <m:ctrlPr>
+                          <a:rPr lang="en-US" altLang="nl-NL" sz="2000" b="1" i="1" smtClean="0">
+                            <a:latin typeface="Cambria Math" panose="02040503050406030204" pitchFamily="18" charset="0"/>
+                          </a:rPr>
+                        </m:ctrlPr>
+                      </m:sSubPr>
+                      <m:e>
+                        <m:r>
+                          <a:rPr lang="en-US" altLang="nl-NL" sz="2000" b="1" i="1" smtClean="0">
+                            <a:latin typeface="Cambria Math" panose="02040503050406030204" pitchFamily="18" charset="0"/>
+                          </a:rPr>
+                          <m:t>𝒛</m:t>
+                        </m:r>
+                      </m:e>
+                      <m:sub>
+                        <m:r>
+                          <a:rPr lang="en-US" altLang="nl-NL" sz="2000" b="1" i="1" smtClean="0">
+                            <a:latin typeface="Cambria Math" panose="02040503050406030204" pitchFamily="18" charset="0"/>
+                          </a:rPr>
+                          <m:t>𝒎𝒊𝒏</m:t>
+                        </m:r>
+                      </m:sub>
+                    </m:sSub>
+                    <m:r>
+                      <a:rPr lang="en-US" altLang="nl-NL" sz="2000" b="1" i="1" smtClean="0">
+                        <a:latin typeface="Cambria Math" panose="02040503050406030204" pitchFamily="18" charset="0"/>
+                      </a:rPr>
+                      <m:t> </m:t>
+                    </m:r>
+                    <m:r>
+                      <a:rPr lang="en-US" altLang="nl-NL" sz="2000" b="1" i="1" smtClean="0">
+                        <a:latin typeface="Cambria Math" panose="02040503050406030204" pitchFamily="18" charset="0"/>
+                        <a:ea typeface="Cambria Math" panose="02040503050406030204" pitchFamily="18" charset="0"/>
+                      </a:rPr>
+                      <m:t>≤</m:t>
+                    </m:r>
+                    <m:r>
+                      <a:rPr lang="en-US" altLang="nl-NL" sz="2000" b="1" i="1" smtClean="0">
+                        <a:latin typeface="Cambria Math" panose="02040503050406030204" pitchFamily="18" charset="0"/>
+                        <a:ea typeface="Cambria Math" panose="02040503050406030204" pitchFamily="18" charset="0"/>
+                      </a:rPr>
+                      <m:t>𝒛</m:t>
+                    </m:r>
+                    <m:r>
+                      <a:rPr lang="en-US" altLang="nl-NL" sz="2000" b="1" i="1" smtClean="0">
+                        <a:latin typeface="Cambria Math" panose="02040503050406030204" pitchFamily="18" charset="0"/>
+                        <a:ea typeface="Cambria Math" panose="02040503050406030204" pitchFamily="18" charset="0"/>
+                      </a:rPr>
+                      <m:t> ≤ </m:t>
+                    </m:r>
+                    <m:sSub>
+                      <m:sSubPr>
+                        <m:ctrlPr>
+                          <a:rPr lang="en-US" altLang="nl-NL" sz="2000" b="1" i="1" smtClean="0">
+                            <a:latin typeface="Cambria Math" panose="02040503050406030204" pitchFamily="18" charset="0"/>
+                            <a:ea typeface="Cambria Math" panose="02040503050406030204" pitchFamily="18" charset="0"/>
+                          </a:rPr>
+                        </m:ctrlPr>
+                      </m:sSubPr>
+                      <m:e>
+                        <m:r>
+                          <a:rPr lang="en-US" altLang="nl-NL" sz="2000" b="1" i="1" smtClean="0">
+                            <a:latin typeface="Cambria Math" panose="02040503050406030204" pitchFamily="18" charset="0"/>
+                            <a:ea typeface="Cambria Math" panose="02040503050406030204" pitchFamily="18" charset="0"/>
+                          </a:rPr>
+                          <m:t>𝒛</m:t>
+                        </m:r>
+                      </m:e>
+                      <m:sub>
+                        <m:r>
+                          <a:rPr lang="en-US" altLang="nl-NL" sz="2000" b="1" i="1" smtClean="0">
+                            <a:latin typeface="Cambria Math" panose="02040503050406030204" pitchFamily="18" charset="0"/>
+                            <a:ea typeface="Cambria Math" panose="02040503050406030204" pitchFamily="18" charset="0"/>
+                          </a:rPr>
+                          <m:t>𝒎𝒂𝒙</m:t>
+                        </m:r>
+                      </m:sub>
+                    </m:sSub>
+                  </m:oMath>
+                </a14:m>
+                <a:r>
+                  <a:rPr lang="en-US" altLang="nl-NL" sz="2000" dirty="0"/>
+                  <a:t>. Zoom level increases/decreases with 10% </a:t>
+                </a:r>
+                <a:r>
+                  <a:rPr lang="en-US" altLang="nl-NL" sz="2000"/>
+                  <a:t>each level.</a:t>
+                </a:r>
+                <a:endParaRPr lang="en-US" altLang="nl-NL" sz="2000" dirty="0"/>
+              </a:p>
+            </p:txBody>
+          </p:sp>
+        </mc:Choice>
+        <mc:Fallback>
+          <p:sp>
+            <p:nvSpPr>
+              <p:cNvPr id="66563" name="Content Placeholder 2"/>
+              <p:cNvSpPr>
+                <a:spLocks noGrp="1" noRot="1" noChangeAspect="1" noMove="1" noResize="1" noEditPoints="1" noAdjustHandles="1" noChangeArrowheads="1" noChangeShapeType="1" noTextEdit="1"/>
+              </p:cNvSpPr>
+              <p:nvPr>
+                <p:ph idx="1"/>
+              </p:nvPr>
+            </p:nvSpPr>
+            <p:spPr>
+              <a:xfrm>
+                <a:off x="611188" y="1600200"/>
+                <a:ext cx="7994650" cy="4673116"/>
+              </a:xfrm>
+              <a:blipFill>
+                <a:blip r:embed="rId2"/>
+                <a:stretch>
+                  <a:fillRect l="-1829" t="-1567" r="-1753"/>
+                </a:stretch>
+              </a:blipFill>
+            </p:spPr>
+            <p:txBody>
+              <a:bodyPr/>
+              <a:lstStyle/>
+              <a:p>
+                <a:r>
+                  <a:rPr lang="en-US">
+                    <a:noFill/>
+                  </a:rPr>
+                  <a:t> </a:t>
+                </a:r>
+              </a:p>
+            </p:txBody>
+          </p:sp>
+        </mc:Fallback>
+      </mc:AlternateContent>
     </p:spTree>
     <p:extLst>
       <p:ext uri="{BB962C8B-B14F-4D97-AF65-F5344CB8AC3E}">
@@ -14535,10 +14680,9 @@
           <a:lstStyle/>
           <a:p>
             <a:r>
-              <a:rPr lang="en-US" altLang="nl-NL" dirty="0" smtClean="0"/>
+              <a:rPr lang="en-US" altLang="nl-NL" dirty="0"/>
               <a:t>Data generation</a:t>
             </a:r>
-            <a:endParaRPr lang="en-US" altLang="nl-NL" dirty="0"/>
           </a:p>
         </p:txBody>
       </p:sp>
@@ -14563,19 +14707,19 @@
           <a:lstStyle/>
           <a:p>
             <a:r>
-              <a:rPr lang="en-US" altLang="nl-NL" sz="2000" dirty="0" smtClean="0"/>
+              <a:rPr lang="en-US" altLang="nl-NL" sz="2000" dirty="0"/>
               <a:t>Randomly generated data</a:t>
             </a:r>
           </a:p>
           <a:p>
             <a:r>
-              <a:rPr lang="en-US" altLang="nl-NL" sz="2000" dirty="0" smtClean="0"/>
+              <a:rPr lang="en-US" altLang="nl-NL" sz="2000" dirty="0"/>
               <a:t>Placement of dots inside regions of the map</a:t>
             </a:r>
           </a:p>
           <a:p>
             <a:r>
-              <a:rPr lang="en-US" altLang="nl-NL" sz="2000" dirty="0" smtClean="0"/>
+              <a:rPr lang="en-US" altLang="nl-NL" sz="2000" dirty="0"/>
               <a:t>Regions with higher population density have higher priority</a:t>
             </a:r>
             <a:endParaRPr lang="en-US" altLang="nl-NL" sz="1800" dirty="0"/>
@@ -14780,10 +14924,9 @@
           <a:lstStyle/>
           <a:p>
             <a:r>
-              <a:rPr lang="en-US" altLang="nl-NL" dirty="0" smtClean="0"/>
+              <a:rPr lang="en-US" altLang="nl-NL" dirty="0"/>
               <a:t>Problem definition</a:t>
             </a:r>
-            <a:endParaRPr lang="en-US" altLang="nl-NL" dirty="0"/>
           </a:p>
         </p:txBody>
       </p:sp>
@@ -14810,41 +14953,36 @@
             <a:pPr lvl="1"/>
             <a:r>
               <a:rPr lang="en-US" altLang="nl-NL" sz="2400" dirty="0"/>
-              <a:t>Ratio of people per dot at zoom level</a:t>
-            </a:r>
-            <a:r>
-              <a:rPr lang="en-US" altLang="nl-NL" sz="2400" dirty="0" smtClean="0"/>
-              <a:t>.</a:t>
+              <a:t>Ratio of people per dot at zoom level.</a:t>
             </a:r>
           </a:p>
           <a:p>
             <a:pPr lvl="1"/>
             <a:r>
-              <a:rPr lang="en-US" altLang="nl-NL" sz="2400" dirty="0" smtClean="0"/>
+              <a:rPr lang="en-US" altLang="nl-NL" sz="2400" dirty="0"/>
               <a:t>Splitting of dots into groups.</a:t>
             </a:r>
           </a:p>
           <a:p>
             <a:pPr lvl="1"/>
             <a:r>
-              <a:rPr lang="en-US" altLang="nl-NL" sz="2400" dirty="0" smtClean="0"/>
+              <a:rPr lang="en-US" altLang="nl-NL" sz="2400" dirty="0"/>
               <a:t>Size/radius of the dots.</a:t>
             </a:r>
           </a:p>
           <a:p>
             <a:pPr lvl="1"/>
             <a:r>
-              <a:rPr lang="en-US" altLang="nl-NL" sz="2400" dirty="0" smtClean="0"/>
+              <a:rPr lang="en-US" altLang="nl-NL" sz="2400" dirty="0"/>
               <a:t>Location of the dots.</a:t>
             </a:r>
           </a:p>
           <a:p>
             <a:pPr lvl="1"/>
             <a:r>
-              <a:rPr lang="en-US" altLang="nl-NL" sz="2400" dirty="0" smtClean="0"/>
+              <a:rPr lang="en-US" altLang="nl-NL" sz="2400" dirty="0"/>
               <a:t>Color of the dots.</a:t>
             </a:r>
-            <a:endParaRPr lang="en-US" altLang="nl-NL" sz="2400" dirty="0"/>
           </a:p>
         </p:txBody>
       </p:sp>
@@ -14894,10 +15032,9 @@
           <a:lstStyle/>
           <a:p>
             <a:r>
-              <a:rPr lang="en-US" altLang="nl-NL" dirty="0" smtClean="0"/>
+              <a:rPr lang="en-US" altLang="nl-NL" dirty="0"/>
               <a:t>People per dot</a:t>
             </a:r>
-            <a:endParaRPr lang="en-US" altLang="nl-NL" dirty="0"/>
           </a:p>
         </p:txBody>
       </p:sp>
@@ -14967,13 +15104,8 @@
             </a:pPr>
             <a:r>
               <a:rPr lang="en-US" altLang="nl-NL" sz="2000" dirty="0"/>
-              <a:t>We apply the rounded number to the aggregation algorithm</a:t>
-            </a:r>
-            <a:r>
-              <a:rPr lang="en-US" altLang="nl-NL" sz="2000" dirty="0" smtClean="0"/>
-              <a:t>.</a:t>
-            </a:r>
-            <a:endParaRPr lang="en-US" altLang="nl-NL" sz="2000" dirty="0"/>
+              <a:t>We apply the rounded number to the aggregation algorithm.</a:t>
+            </a:r>
           </a:p>
         </p:txBody>
       </p:sp>
@@ -15023,10 +15155,9 @@
           <a:lstStyle/>
           <a:p>
             <a:r>
-              <a:rPr lang="en-US" altLang="nl-NL" dirty="0" smtClean="0"/>
+              <a:rPr lang="en-US" altLang="nl-NL" dirty="0"/>
               <a:t>Splitting dots into groups</a:t>
             </a:r>
-            <a:endParaRPr lang="en-US" altLang="nl-NL" dirty="0"/>
           </a:p>
         </p:txBody>
       </p:sp>
@@ -15052,16 +15183,8 @@
           <a:p>
             <a:pPr lvl="1"/>
             <a:r>
-              <a:rPr lang="en-US" altLang="nl-NL" sz="2400" dirty="0" smtClean="0"/>
-              <a:t>Recursive algorithm that splits region into 4</a:t>
-            </a:r>
-            <a:r>
               <a:rPr lang="en-US" altLang="nl-NL" sz="2400" dirty="0"/>
-              <a:t> </a:t>
-            </a:r>
-            <a:r>
-              <a:rPr lang="en-US" altLang="nl-NL" sz="2400" dirty="0" smtClean="0"/>
-              <a:t>until the region has less or equal to the number of the group size.</a:t>
+              <a:t>Recursive algorithm that splits region into 4 until the region has less or equal to the number of the group size.</a:t>
             </a:r>
           </a:p>
         </p:txBody>

</xml_diff>